<commit_message>
Update HUNDIR LA FLOTA - ANÁLIISIS.pptx
</commit_message>
<xml_diff>
--- a/Documentacion/JBC/HUNDIR LA FLOTA - ANÁLIISIS.pptx
+++ b/Documentacion/JBC/HUNDIR LA FLOTA - ANÁLIISIS.pptx
@@ -3336,7 +3336,7 @@
         </p:nvSpPr>
         <p:spPr>
           <a:xfrm>
-            <a:off x="8176491" y="4057066"/>
+            <a:off x="7629236" y="3927757"/>
             <a:ext cx="2752436" cy="1433947"/>
           </a:xfrm>
           <a:prstGeom prst="rect">
@@ -3419,6 +3419,10 @@
               <a:buFont typeface="Arial" panose="020B0604020202020204" pitchFamily="34" charset="0"/>
               <a:buChar char="•"/>
             </a:pPr>
+            <a:r>
+              <a:rPr lang="es-ES" sz="1100" dirty="0" smtClean="0"/>
+              <a:t>RANGOS = []</a:t>
+            </a:r>
             <a:endParaRPr lang="es-ES" sz="1100" dirty="0"/>
           </a:p>
           <a:p>
@@ -3428,18 +3432,9 @@
             </a:pPr>
             <a:r>
               <a:rPr lang="es-ES" sz="1100" dirty="0" smtClean="0"/>
-              <a:t>…</a:t>
-            </a:r>
-          </a:p>
-          <a:p>
-            <a:pPr marL="285750" indent="-285750">
-              <a:buFont typeface="Arial" panose="020B0604020202020204" pitchFamily="34" charset="0"/>
-              <a:buChar char="•"/>
-            </a:pPr>
-            <a:r>
-              <a:rPr lang="es-ES" sz="1100" dirty="0" smtClean="0"/>
-              <a:t>…</a:t>
-            </a:r>
+              <a:t>FLOTA = []</a:t>
+            </a:r>
+            <a:endParaRPr lang="es-ES" sz="1100" dirty="0" smtClean="0"/>
           </a:p>
         </p:txBody>
       </p:sp>

</xml_diff>

<commit_message>
Update ppt partida 2
</commit_message>
<xml_diff>
--- a/Documentacion/JBC/HUNDIR LA FLOTA - ANÁLIISIS.pptx
+++ b/Documentacion/JBC/HUNDIR LA FLOTA - ANÁLIISIS.pptx
@@ -4133,15 +4133,15 @@
       </p:sp>
       <p:pic>
         <p:nvPicPr>
-          <p:cNvPr id="4" name="Imagen 3">
+          <p:cNvPr id="1026" name="Picture 2">
             <a:extLst>
               <a:ext uri="{FF2B5EF4-FFF2-40B4-BE49-F238E27FC236}">
-                <a16:creationId xmlns:a16="http://schemas.microsoft.com/office/drawing/2014/main" id="{1E2E1F9E-39DC-43B1-8481-2C001FB0025F}"/>
+                <a16:creationId xmlns:a16="http://schemas.microsoft.com/office/drawing/2014/main" id="{EA9C3E73-7677-4115-B213-570A90DAD9AF}"/>
               </a:ext>
             </a:extLst>
           </p:cNvPr>
           <p:cNvPicPr>
-            <a:picLocks noChangeAspect="1"/>
+            <a:picLocks noChangeAspect="1" noChangeArrowheads="1"/>
           </p:cNvPicPr>
           <p:nvPr/>
         </p:nvPicPr>
@@ -4153,31 +4153,42 @@
               </a:ext>
             </a:extLst>
           </a:blip>
+          <a:srcRect/>
           <a:stretch>
             <a:fillRect/>
           </a:stretch>
         </p:blipFill>
-        <p:spPr>
+        <p:spPr bwMode="auto">
           <a:xfrm>
-            <a:off x="946315" y="2085924"/>
-            <a:ext cx="5358993" cy="2343403"/>
+            <a:off x="999314" y="637187"/>
+            <a:ext cx="5025349" cy="5892917"/>
           </a:xfrm>
           <a:prstGeom prst="rect">
             <a:avLst/>
           </a:prstGeom>
+          <a:noFill/>
+          <a:extLst>
+            <a:ext uri="{909E8E84-426E-40DD-AFC4-6F175D3DCCD1}">
+              <a14:hiddenFill xmlns:a14="http://schemas.microsoft.com/office/drawing/2010/main">
+                <a:solidFill>
+                  <a:srgbClr val="FFFFFF"/>
+                </a:solidFill>
+              </a14:hiddenFill>
+            </a:ext>
+          </a:extLst>
         </p:spPr>
       </p:pic>
       <p:pic>
         <p:nvPicPr>
-          <p:cNvPr id="6" name="Imagen 5">
+          <p:cNvPr id="1030" name="Picture 6">
             <a:extLst>
               <a:ext uri="{FF2B5EF4-FFF2-40B4-BE49-F238E27FC236}">
-                <a16:creationId xmlns:a16="http://schemas.microsoft.com/office/drawing/2014/main" id="{67123BAF-14C3-400C-879B-129D27EB385A}"/>
+                <a16:creationId xmlns:a16="http://schemas.microsoft.com/office/drawing/2014/main" id="{DCCB32A3-3B6F-4C37-B381-26984D8E0AB2}"/>
               </a:ext>
             </a:extLst>
           </p:cNvPr>
           <p:cNvPicPr>
-            <a:picLocks noChangeAspect="1"/>
+            <a:picLocks noChangeAspect="1" noChangeArrowheads="1"/>
           </p:cNvPicPr>
           <p:nvPr/>
         </p:nvPicPr>
@@ -4189,18 +4200,29 @@
               </a:ext>
             </a:extLst>
           </a:blip>
+          <a:srcRect/>
           <a:stretch>
             <a:fillRect/>
           </a:stretch>
         </p:blipFill>
-        <p:spPr>
+        <p:spPr bwMode="auto">
           <a:xfrm>
-            <a:off x="6350400" y="637187"/>
-            <a:ext cx="5483274" cy="5731187"/>
+            <a:off x="6167339" y="1060938"/>
+            <a:ext cx="5579152" cy="5045413"/>
           </a:xfrm>
           <a:prstGeom prst="rect">
             <a:avLst/>
           </a:prstGeom>
+          <a:noFill/>
+          <a:extLst>
+            <a:ext uri="{909E8E84-426E-40DD-AFC4-6F175D3DCCD1}">
+              <a14:hiddenFill xmlns:a14="http://schemas.microsoft.com/office/drawing/2010/main">
+                <a:solidFill>
+                  <a:srgbClr val="FFFFFF"/>
+                </a:solidFill>
+              </a14:hiddenFill>
+            </a:ext>
+          </a:extLst>
         </p:spPr>
       </p:pic>
     </p:spTree>

</xml_diff>